<commit_message>
Added Hands On Dems - Day 16
</commit_message>
<xml_diff>
--- a/4. JavaScript (ES6) & Node.js/Day 16/Slides/5. Functions and Scope/functions-and-scope-slides.pptx
+++ b/4. JavaScript (ES6) & Node.js/Day 16/Slides/5. Functions and Scope/functions-and-scope-slides.pptx
@@ -13766,7 +13766,7 @@
         <p:spPr>
           <a:xfrm>
             <a:off x="688635" y="1596644"/>
-            <a:ext cx="8500745" cy="4551680"/>
+            <a:ext cx="8500745" cy="4585335"/>
           </a:xfrm>
           <a:prstGeom prst="rect">
             <a:avLst/>
@@ -13975,14 +13975,24 @@
               <a:t>function </a:t>
             </a:r>
             <a:r>
-              <a:rPr sz="2400" spc="-5" dirty="0">
-                <a:solidFill>
-                  <a:srgbClr val="404040"/>
-                </a:solidFill>
-                <a:latin typeface="Courier New" panose="02070309020205020404"/>
-                <a:cs typeface="Courier New" panose="02070309020205020404"/>
-              </a:rPr>
-              <a:t>startCar() </a:t>
+              <a:rPr lang="en-US" sz="2400" spc="-5" dirty="0">
+                <a:solidFill>
+                  <a:srgbClr val="404040"/>
+                </a:solidFill>
+                <a:latin typeface="Courier New" panose="02070309020205020404"/>
+                <a:cs typeface="Courier New" panose="02070309020205020404"/>
+              </a:rPr>
+              <a:t>turnKey</a:t>
+            </a:r>
+            <a:r>
+              <a:rPr sz="2400" spc="-5" dirty="0">
+                <a:solidFill>
+                  <a:srgbClr val="404040"/>
+                </a:solidFill>
+                <a:latin typeface="Courier New" panose="02070309020205020404"/>
+                <a:cs typeface="Courier New" panose="02070309020205020404"/>
+              </a:rPr>
+              <a:t>() </a:t>
             </a:r>
             <a:r>
               <a:rPr sz="2400" dirty="0">
@@ -14287,7 +14297,7 @@
         <p:spPr>
           <a:xfrm>
             <a:off x="688635" y="1453388"/>
-            <a:ext cx="8058784" cy="4688840"/>
+            <a:ext cx="8058784" cy="4721225"/>
           </a:xfrm>
           <a:prstGeom prst="rect">
             <a:avLst/>
@@ -14533,14 +14543,24 @@
               <a:t> </a:t>
             </a:r>
             <a:r>
-              <a:rPr sz="2400" spc="-5" dirty="0">
-                <a:solidFill>
-                  <a:srgbClr val="404040"/>
-                </a:solidFill>
-                <a:latin typeface="Courier New" panose="02070309020205020404"/>
-                <a:cs typeface="Courier New" panose="02070309020205020404"/>
-              </a:rPr>
-              <a:t>startCar()</a:t>
+              <a:rPr lang="en-US" sz="2400" spc="-5" dirty="0">
+                <a:solidFill>
+                  <a:srgbClr val="404040"/>
+                </a:solidFill>
+                <a:latin typeface="Courier New" panose="02070309020205020404"/>
+                <a:cs typeface="Courier New" panose="02070309020205020404"/>
+              </a:rPr>
+              <a:t>turnKey</a:t>
+            </a:r>
+            <a:r>
+              <a:rPr sz="2400" spc="-5" dirty="0">
+                <a:solidFill>
+                  <a:srgbClr val="404040"/>
+                </a:solidFill>
+                <a:latin typeface="Courier New" panose="02070309020205020404"/>
+                <a:cs typeface="Courier New" panose="02070309020205020404"/>
+              </a:rPr>
+              <a:t>()</a:t>
             </a:r>
             <a:r>
               <a:rPr sz="2400" spc="-25" dirty="0">

</xml_diff>